<commit_message>
Expo sharing 동작만 구현
</commit_message>
<xml_diff>
--- a/졸작 시스템구성도.pptx
+++ b/졸작 시스템구성도.pptx
@@ -261,7 +261,7 @@
           <a:p>
             <a:fld id="{A7A2C48F-D677-411A-B734-E51AF5034C05}" type="datetimeFigureOut">
               <a:rPr lang="ko-KR" altLang="en-US" smtClean="0"/>
-              <a:t>2023-10-09</a:t>
+              <a:t>2023-10-23</a:t>
             </a:fld>
             <a:endParaRPr lang="ko-KR" altLang="en-US"/>
           </a:p>
@@ -459,7 +459,7 @@
           <a:p>
             <a:fld id="{A7A2C48F-D677-411A-B734-E51AF5034C05}" type="datetimeFigureOut">
               <a:rPr lang="ko-KR" altLang="en-US" smtClean="0"/>
-              <a:t>2023-10-09</a:t>
+              <a:t>2023-10-23</a:t>
             </a:fld>
             <a:endParaRPr lang="ko-KR" altLang="en-US"/>
           </a:p>
@@ -667,7 +667,7 @@
           <a:p>
             <a:fld id="{A7A2C48F-D677-411A-B734-E51AF5034C05}" type="datetimeFigureOut">
               <a:rPr lang="ko-KR" altLang="en-US" smtClean="0"/>
-              <a:t>2023-10-09</a:t>
+              <a:t>2023-10-23</a:t>
             </a:fld>
             <a:endParaRPr lang="ko-KR" altLang="en-US"/>
           </a:p>
@@ -865,7 +865,7 @@
           <a:p>
             <a:fld id="{A7A2C48F-D677-411A-B734-E51AF5034C05}" type="datetimeFigureOut">
               <a:rPr lang="ko-KR" altLang="en-US" smtClean="0"/>
-              <a:t>2023-10-09</a:t>
+              <a:t>2023-10-23</a:t>
             </a:fld>
             <a:endParaRPr lang="ko-KR" altLang="en-US"/>
           </a:p>
@@ -1140,7 +1140,7 @@
           <a:p>
             <a:fld id="{A7A2C48F-D677-411A-B734-E51AF5034C05}" type="datetimeFigureOut">
               <a:rPr lang="ko-KR" altLang="en-US" smtClean="0"/>
-              <a:t>2023-10-09</a:t>
+              <a:t>2023-10-23</a:t>
             </a:fld>
             <a:endParaRPr lang="ko-KR" altLang="en-US"/>
           </a:p>
@@ -1405,7 +1405,7 @@
           <a:p>
             <a:fld id="{A7A2C48F-D677-411A-B734-E51AF5034C05}" type="datetimeFigureOut">
               <a:rPr lang="ko-KR" altLang="en-US" smtClean="0"/>
-              <a:t>2023-10-09</a:t>
+              <a:t>2023-10-23</a:t>
             </a:fld>
             <a:endParaRPr lang="ko-KR" altLang="en-US"/>
           </a:p>
@@ -1817,7 +1817,7 @@
           <a:p>
             <a:fld id="{A7A2C48F-D677-411A-B734-E51AF5034C05}" type="datetimeFigureOut">
               <a:rPr lang="ko-KR" altLang="en-US" smtClean="0"/>
-              <a:t>2023-10-09</a:t>
+              <a:t>2023-10-23</a:t>
             </a:fld>
             <a:endParaRPr lang="ko-KR" altLang="en-US"/>
           </a:p>
@@ -1958,7 +1958,7 @@
           <a:p>
             <a:fld id="{A7A2C48F-D677-411A-B734-E51AF5034C05}" type="datetimeFigureOut">
               <a:rPr lang="ko-KR" altLang="en-US" smtClean="0"/>
-              <a:t>2023-10-09</a:t>
+              <a:t>2023-10-23</a:t>
             </a:fld>
             <a:endParaRPr lang="ko-KR" altLang="en-US"/>
           </a:p>
@@ -2071,7 +2071,7 @@
           <a:p>
             <a:fld id="{A7A2C48F-D677-411A-B734-E51AF5034C05}" type="datetimeFigureOut">
               <a:rPr lang="ko-KR" altLang="en-US" smtClean="0"/>
-              <a:t>2023-10-09</a:t>
+              <a:t>2023-10-23</a:t>
             </a:fld>
             <a:endParaRPr lang="ko-KR" altLang="en-US"/>
           </a:p>
@@ -2382,7 +2382,7 @@
           <a:p>
             <a:fld id="{A7A2C48F-D677-411A-B734-E51AF5034C05}" type="datetimeFigureOut">
               <a:rPr lang="ko-KR" altLang="en-US" smtClean="0"/>
-              <a:t>2023-10-09</a:t>
+              <a:t>2023-10-23</a:t>
             </a:fld>
             <a:endParaRPr lang="ko-KR" altLang="en-US"/>
           </a:p>
@@ -2670,7 +2670,7 @@
           <a:p>
             <a:fld id="{A7A2C48F-D677-411A-B734-E51AF5034C05}" type="datetimeFigureOut">
               <a:rPr lang="ko-KR" altLang="en-US" smtClean="0"/>
-              <a:t>2023-10-09</a:t>
+              <a:t>2023-10-23</a:t>
             </a:fld>
             <a:endParaRPr lang="ko-KR" altLang="en-US"/>
           </a:p>
@@ -2911,7 +2911,7 @@
           <a:p>
             <a:fld id="{A7A2C48F-D677-411A-B734-E51AF5034C05}" type="datetimeFigureOut">
               <a:rPr lang="ko-KR" altLang="en-US" smtClean="0"/>
-              <a:t>2023-10-09</a:t>
+              <a:t>2023-10-23</a:t>
             </a:fld>
             <a:endParaRPr lang="ko-KR" altLang="en-US"/>
           </a:p>
@@ -6855,7 +6855,7 @@
     <mc:Choice Requires="p14">
       <p:transition/>
     </mc:Choice>
-    <mc:Fallback xmlns:dsp="http://schemas.microsoft.com/office/drawing/2008/diagram" xmlns:dgm="http://schemas.openxmlformats.org/drawingml/2006/diagram" xmlns:c="http://schemas.openxmlformats.org/drawingml/2006/chart" xmlns="">
+    <mc:Fallback xmlns="" xmlns:c="http://schemas.openxmlformats.org/drawingml/2006/chart" xmlns:dgm="http://schemas.openxmlformats.org/drawingml/2006/diagram" xmlns:dsp="http://schemas.microsoft.com/office/drawing/2008/diagram">
       <p:transition/>
     </mc:Fallback>
   </mc:AlternateContent>
@@ -6879,46 +6879,131 @@
           <a:chExt cx="0" cy="0"/>
         </a:xfrm>
       </p:grpSpPr>
-      <p:sp>
-        <p:nvSpPr>
-          <p:cNvPr id="2" name="제목 1"/>
-          <p:cNvSpPr>
-            <a:spLocks noGrp="1"/>
-          </p:cNvSpPr>
-          <p:nvPr>
-            <p:ph type="title"/>
-          </p:nvPr>
-        </p:nvSpPr>
-        <p:spPr/>
-        <p:txBody>
-          <a:bodyPr/>
-          <a:lstStyle/>
-          <a:p>
-            <a:pPr>
-              <a:defRPr/>
-            </a:pPr>
-            <a:endParaRPr lang="ko-KR" altLang="en-US"/>
-          </a:p>
-        </p:txBody>
-      </p:sp>
-      <p:sp>
-        <p:nvSpPr>
-          <p:cNvPr id="3" name="내용 개체 틀 2"/>
-          <p:cNvSpPr>
-            <a:spLocks noGrp="1"/>
-          </p:cNvSpPr>
-          <p:nvPr>
-            <p:ph idx="1"/>
-          </p:nvPr>
-        </p:nvSpPr>
-        <p:spPr/>
-        <p:txBody>
-          <a:bodyPr/>
-          <a:lstStyle/>
-          <a:p>
-            <a:pPr>
-              <a:defRPr/>
-            </a:pPr>
+      <p:pic>
+        <p:nvPicPr>
+          <p:cNvPr id="5" name="그림 4" descr="텍스트, 스크린샷, 도표, 폰트이(가) 표시된 사진&#10;&#10;자동 생성된 설명">
+            <a:extLst>
+              <a:ext uri="{FF2B5EF4-FFF2-40B4-BE49-F238E27FC236}">
+                <a16:creationId xmlns:a16="http://schemas.microsoft.com/office/drawing/2014/main" id="{81C104F0-B7D5-0545-9510-EFB72E696A94}"/>
+              </a:ext>
+            </a:extLst>
+          </p:cNvPr>
+          <p:cNvPicPr>
+            <a:picLocks noChangeAspect="1"/>
+          </p:cNvPicPr>
+          <p:nvPr/>
+        </p:nvPicPr>
+        <p:blipFill>
+          <a:blip r:embed="rId2">
+            <a:extLst>
+              <a:ext uri="{28A0092B-C50C-407E-A947-70E740481C1C}">
+                <a14:useLocalDpi xmlns:a14="http://schemas.microsoft.com/office/drawing/2010/main" val="0"/>
+              </a:ext>
+            </a:extLst>
+          </a:blip>
+          <a:stretch>
+            <a:fillRect/>
+          </a:stretch>
+        </p:blipFill>
+        <p:spPr>
+          <a:xfrm>
+            <a:off x="529515" y="1557909"/>
+            <a:ext cx="17471148" cy="9076181"/>
+          </a:xfrm>
+          <a:prstGeom prst="rect">
+            <a:avLst/>
+          </a:prstGeom>
+        </p:spPr>
+      </p:pic>
+      <p:cxnSp>
+        <p:nvCxnSpPr>
+          <p:cNvPr id="7" name="직선 화살표 연결선 6">
+            <a:extLst>
+              <a:ext uri="{FF2B5EF4-FFF2-40B4-BE49-F238E27FC236}">
+                <a16:creationId xmlns:a16="http://schemas.microsoft.com/office/drawing/2014/main" id="{547E0E72-2A01-F4F8-3BA7-9B7630A978FC}"/>
+              </a:ext>
+            </a:extLst>
+          </p:cNvPr>
+          <p:cNvCxnSpPr/>
+          <p:nvPr/>
+        </p:nvCxnSpPr>
+        <p:spPr>
+          <a:xfrm>
+            <a:off x="14702064" y="5649686"/>
+            <a:ext cx="0" cy="1619250"/>
+          </a:xfrm>
+          <a:prstGeom prst="straightConnector1">
+            <a:avLst/>
+          </a:prstGeom>
+          <a:ln w="25400">
+            <a:tailEnd type="triangle"/>
+          </a:ln>
+        </p:spPr>
+        <p:style>
+          <a:lnRef idx="1">
+            <a:schemeClr val="dk1"/>
+          </a:lnRef>
+          <a:fillRef idx="0">
+            <a:schemeClr val="dk1"/>
+          </a:fillRef>
+          <a:effectRef idx="0">
+            <a:schemeClr val="dk1"/>
+          </a:effectRef>
+          <a:fontRef idx="minor">
+            <a:schemeClr val="tx1"/>
+          </a:fontRef>
+        </p:style>
+      </p:cxnSp>
+      <p:sp>
+        <p:nvSpPr>
+          <p:cNvPr id="9" name="직사각형 8">
+            <a:extLst>
+              <a:ext uri="{FF2B5EF4-FFF2-40B4-BE49-F238E27FC236}">
+                <a16:creationId xmlns:a16="http://schemas.microsoft.com/office/drawing/2014/main" id="{DF339904-7FB0-8D32-9E30-57AD010AD29F}"/>
+              </a:ext>
+            </a:extLst>
+          </p:cNvPr>
+          <p:cNvSpPr/>
+          <p:nvPr/>
+        </p:nvSpPr>
+        <p:spPr>
+          <a:xfrm>
+            <a:off x="9797143" y="5549272"/>
+            <a:ext cx="2989943" cy="1446613"/>
+          </a:xfrm>
+          <a:prstGeom prst="rect">
+            <a:avLst/>
+          </a:prstGeom>
+          <a:solidFill>
+            <a:schemeClr val="bg1"/>
+          </a:solidFill>
+          <a:ln>
+            <a:solidFill>
+              <a:schemeClr val="bg1"/>
+            </a:solidFill>
+          </a:ln>
+        </p:spPr>
+        <p:style>
+          <a:lnRef idx="2">
+            <a:schemeClr val="accent1">
+              <a:shade val="15000"/>
+            </a:schemeClr>
+          </a:lnRef>
+          <a:fillRef idx="1">
+            <a:schemeClr val="accent1"/>
+          </a:fillRef>
+          <a:effectRef idx="0">
+            <a:schemeClr val="accent1"/>
+          </a:effectRef>
+          <a:fontRef idx="minor">
+            <a:schemeClr val="lt1"/>
+          </a:fontRef>
+        </p:style>
+        <p:txBody>
+          <a:bodyPr rtlCol="0" anchor="ctr"/>
+          <a:lstStyle/>
+          <a:p>
+            <a:pPr algn="ctr"/>
             <a:endParaRPr lang="ko-KR" altLang="en-US"/>
           </a:p>
         </p:txBody>
@@ -6937,7 +7022,7 @@
     <mc:Choice Requires="p14">
       <p:transition/>
     </mc:Choice>
-    <mc:Fallback xmlns:dsp="http://schemas.microsoft.com/office/drawing/2008/diagram" xmlns:dgm="http://schemas.openxmlformats.org/drawingml/2006/diagram" xmlns:c="http://schemas.openxmlformats.org/drawingml/2006/chart" xmlns="">
+    <mc:Fallback xmlns="" xmlns:c="http://schemas.openxmlformats.org/drawingml/2006/chart" xmlns:dgm="http://schemas.openxmlformats.org/drawingml/2006/diagram" xmlns:dsp="http://schemas.microsoft.com/office/drawing/2008/diagram">
       <p:transition/>
     </mc:Fallback>
   </mc:AlternateContent>

</xml_diff>